<commit_message>
backup of work - intro nearly finished ('nearly') - method kind of began - general backup of work
</commit_message>
<xml_diff>
--- a/lab_reports/optical_fourier_transforms/method/diagrams.pptx
+++ b/lab_reports/optical_fourier_transforms/method/diagrams.pptx
@@ -2965,6 +2965,82 @@
           <a:chExt cx="0" cy="0"/>
         </a:xfrm>
       </p:grpSpPr>
+      <p:cxnSp>
+        <p:nvCxnSpPr>
+          <p:cNvPr id="75" name="Straight Arrow Connector 74"/>
+          <p:cNvCxnSpPr/>
+          <p:nvPr/>
+        </p:nvCxnSpPr>
+        <p:spPr>
+          <a:xfrm rot="16200000" flipV="1">
+            <a:off x="5648446" y="3323174"/>
+            <a:ext cx="0" cy="408636"/>
+          </a:xfrm>
+          <a:prstGeom prst="straightConnector1">
+            <a:avLst/>
+          </a:prstGeom>
+          <a:ln w="19050">
+            <a:solidFill>
+              <a:schemeClr val="bg1">
+                <a:lumMod val="85000"/>
+              </a:schemeClr>
+            </a:solidFill>
+            <a:tailEnd type="triangle"/>
+          </a:ln>
+        </p:spPr>
+        <p:style>
+          <a:lnRef idx="1">
+            <a:schemeClr val="accent1"/>
+          </a:lnRef>
+          <a:fillRef idx="0">
+            <a:schemeClr val="accent1"/>
+          </a:fillRef>
+          <a:effectRef idx="0">
+            <a:schemeClr val="accent1"/>
+          </a:effectRef>
+          <a:fontRef idx="minor">
+            <a:schemeClr val="tx1"/>
+          </a:fontRef>
+        </p:style>
+      </p:cxnSp>
+      <p:cxnSp>
+        <p:nvCxnSpPr>
+          <p:cNvPr id="72" name="Straight Arrow Connector 71"/>
+          <p:cNvCxnSpPr/>
+          <p:nvPr/>
+        </p:nvCxnSpPr>
+        <p:spPr>
+          <a:xfrm rot="10800000" flipV="1">
+            <a:off x="3943248" y="2567158"/>
+            <a:ext cx="0" cy="324000"/>
+          </a:xfrm>
+          <a:prstGeom prst="straightConnector1">
+            <a:avLst/>
+          </a:prstGeom>
+          <a:ln w="19050">
+            <a:solidFill>
+              <a:schemeClr val="bg1">
+                <a:lumMod val="85000"/>
+              </a:schemeClr>
+            </a:solidFill>
+            <a:tailEnd type="triangle"/>
+          </a:ln>
+        </p:spPr>
+        <p:style>
+          <a:lnRef idx="1">
+            <a:schemeClr val="accent1"/>
+          </a:lnRef>
+          <a:fillRef idx="0">
+            <a:schemeClr val="accent1"/>
+          </a:fillRef>
+          <a:effectRef idx="0">
+            <a:schemeClr val="accent1"/>
+          </a:effectRef>
+          <a:fontRef idx="minor">
+            <a:schemeClr val="tx1"/>
+          </a:fontRef>
+        </p:style>
+      </p:cxnSp>
       <p:sp>
         <p:nvSpPr>
           <p:cNvPr id="2" name="Rectangle 1"/>
@@ -3200,7 +3276,7 @@
         <p:spPr>
           <a:xfrm flipV="1">
             <a:off x="3466888" y="4209084"/>
-            <a:ext cx="0" cy="953846"/>
+            <a:ext cx="0" cy="701577"/>
           </a:xfrm>
           <a:prstGeom prst="straightConnector1">
             <a:avLst/>
@@ -3237,7 +3313,7 @@
         </p:nvSpPr>
         <p:spPr>
           <a:xfrm>
-            <a:off x="2552401" y="5152259"/>
+            <a:off x="2559305" y="4936648"/>
             <a:ext cx="1876208" cy="369332"/>
           </a:xfrm>
           <a:prstGeom prst="rect">
@@ -3467,7 +3543,7 @@
         </p:nvSpPr>
         <p:spPr>
           <a:xfrm>
-            <a:off x="3921738" y="4565860"/>
+            <a:off x="3921722" y="4545645"/>
             <a:ext cx="1876208" cy="369332"/>
           </a:xfrm>
           <a:prstGeom prst="rect">
@@ -4071,8 +4147,8 @@
         </p:nvSpPr>
         <p:spPr>
           <a:xfrm>
-            <a:off x="3933168" y="2045817"/>
-            <a:ext cx="1876208" cy="369332"/>
+            <a:off x="4518645" y="2043304"/>
+            <a:ext cx="649745" cy="369332"/>
           </a:xfrm>
           <a:prstGeom prst="rect">
             <a:avLst/>
@@ -4507,8 +4583,8 @@
         </p:nvSpPr>
         <p:spPr>
           <a:xfrm>
-            <a:off x="3504852" y="4541329"/>
-            <a:ext cx="1007171" cy="646331"/>
+            <a:off x="3497409" y="4541329"/>
+            <a:ext cx="1007171" cy="369332"/>
           </a:xfrm>
           <a:prstGeom prst="rect">
             <a:avLst/>
@@ -4528,7 +4604,7 @@
                 <a:ea typeface="CMU Serif Roman" charset="0"/>
                 <a:cs typeface="CMU Serif Roman" charset="0"/>
               </a:rPr>
-              <a:t>Grating Holder</a:t>
+              <a:t>Grating</a:t>
             </a:r>
             <a:endParaRPr lang="en-GB" dirty="0">
               <a:latin typeface="CMU Serif Roman" charset="0"/>
@@ -4576,6 +4652,181 @@
           </a:fontRef>
         </p:style>
       </p:cxnSp>
+      <p:sp>
+        <p:nvSpPr>
+          <p:cNvPr id="74" name="TextBox 73"/>
+          <p:cNvSpPr txBox="1"/>
+          <p:nvPr/>
+        </p:nvSpPr>
+        <p:spPr>
+          <a:xfrm>
+            <a:off x="3228250" y="2252256"/>
+            <a:ext cx="1449658" cy="369332"/>
+          </a:xfrm>
+          <a:prstGeom prst="rect">
+            <a:avLst/>
+          </a:prstGeom>
+          <a:noFill/>
+        </p:spPr>
+        <p:txBody>
+          <a:bodyPr wrap="square" rtlCol="0">
+            <a:spAutoFit/>
+          </a:bodyPr>
+          <a:lstStyle/>
+          <a:p>
+            <a:pPr algn="ctr"/>
+            <a:r>
+              <a:rPr lang="en-GB" dirty="0" smtClean="0">
+                <a:solidFill>
+                  <a:schemeClr val="bg1">
+                    <a:lumMod val="75000"/>
+                  </a:schemeClr>
+                </a:solidFill>
+                <a:latin typeface="CMU Serif Roman" charset="0"/>
+                <a:ea typeface="CMU Serif Roman" charset="0"/>
+                <a:cs typeface="CMU Serif Roman" charset="0"/>
+              </a:rPr>
+              <a:t>Image Plane</a:t>
+            </a:r>
+            <a:endParaRPr lang="en-GB" dirty="0">
+              <a:solidFill>
+                <a:schemeClr val="bg1">
+                  <a:lumMod val="75000"/>
+                </a:schemeClr>
+              </a:solidFill>
+              <a:latin typeface="CMU Serif Roman" charset="0"/>
+              <a:ea typeface="CMU Serif Roman" charset="0"/>
+              <a:cs typeface="CMU Serif Roman" charset="0"/>
+            </a:endParaRPr>
+          </a:p>
+        </p:txBody>
+      </p:sp>
+      <p:sp>
+        <p:nvSpPr>
+          <p:cNvPr id="76" name="TextBox 75"/>
+          <p:cNvSpPr txBox="1"/>
+          <p:nvPr/>
+        </p:nvSpPr>
+        <p:spPr>
+          <a:xfrm>
+            <a:off x="5797930" y="3341519"/>
+            <a:ext cx="927927" cy="646331"/>
+          </a:xfrm>
+          <a:prstGeom prst="rect">
+            <a:avLst/>
+          </a:prstGeom>
+          <a:noFill/>
+        </p:spPr>
+        <p:txBody>
+          <a:bodyPr wrap="square" rtlCol="0">
+            <a:spAutoFit/>
+          </a:bodyPr>
+          <a:lstStyle/>
+          <a:p>
+            <a:pPr algn="ctr"/>
+            <a:r>
+              <a:rPr lang="en-GB" dirty="0" smtClean="0">
+                <a:solidFill>
+                  <a:schemeClr val="bg1">
+                    <a:lumMod val="75000"/>
+                  </a:schemeClr>
+                </a:solidFill>
+                <a:latin typeface="CMU Serif Roman" charset="0"/>
+                <a:ea typeface="CMU Serif Roman" charset="0"/>
+                <a:cs typeface="CMU Serif Roman" charset="0"/>
+              </a:rPr>
+              <a:t>Fourier Plane</a:t>
+            </a:r>
+            <a:endParaRPr lang="en-GB" dirty="0">
+              <a:solidFill>
+                <a:schemeClr val="bg1">
+                  <a:lumMod val="75000"/>
+                </a:schemeClr>
+              </a:solidFill>
+              <a:latin typeface="CMU Serif Roman" charset="0"/>
+              <a:ea typeface="CMU Serif Roman" charset="0"/>
+              <a:cs typeface="CMU Serif Roman" charset="0"/>
+            </a:endParaRPr>
+          </a:p>
+        </p:txBody>
+      </p:sp>
+      <p:cxnSp>
+        <p:nvCxnSpPr>
+          <p:cNvPr id="77" name="Straight Arrow Connector 76"/>
+          <p:cNvCxnSpPr/>
+          <p:nvPr/>
+        </p:nvCxnSpPr>
+        <p:spPr>
+          <a:xfrm rot="16200000" flipV="1">
+            <a:off x="5626904" y="2738392"/>
+            <a:ext cx="0" cy="468000"/>
+          </a:xfrm>
+          <a:prstGeom prst="straightConnector1">
+            <a:avLst/>
+          </a:prstGeom>
+          <a:ln w="34925">
+            <a:solidFill>
+              <a:schemeClr val="bg1">
+                <a:lumMod val="75000"/>
+              </a:schemeClr>
+            </a:solidFill>
+            <a:tailEnd type="triangle"/>
+          </a:ln>
+        </p:spPr>
+        <p:style>
+          <a:lnRef idx="1">
+            <a:schemeClr val="accent1"/>
+          </a:lnRef>
+          <a:fillRef idx="0">
+            <a:schemeClr val="accent1"/>
+          </a:fillRef>
+          <a:effectRef idx="0">
+            <a:schemeClr val="accent1"/>
+          </a:effectRef>
+          <a:fontRef idx="minor">
+            <a:schemeClr val="tx1"/>
+          </a:fontRef>
+        </p:style>
+      </p:cxnSp>
+      <p:sp>
+        <p:nvSpPr>
+          <p:cNvPr id="78" name="TextBox 77"/>
+          <p:cNvSpPr txBox="1"/>
+          <p:nvPr/>
+        </p:nvSpPr>
+        <p:spPr>
+          <a:xfrm>
+            <a:off x="5812174" y="2798606"/>
+            <a:ext cx="909631" cy="369332"/>
+          </a:xfrm>
+          <a:prstGeom prst="rect">
+            <a:avLst/>
+          </a:prstGeom>
+          <a:noFill/>
+        </p:spPr>
+        <p:txBody>
+          <a:bodyPr wrap="square" rtlCol="0">
+            <a:spAutoFit/>
+          </a:bodyPr>
+          <a:lstStyle/>
+          <a:p>
+            <a:pPr algn="ctr"/>
+            <a:r>
+              <a:rPr lang="en-GB" dirty="0" smtClean="0">
+                <a:latin typeface="CMU Serif Roman" charset="0"/>
+                <a:ea typeface="CMU Serif Roman" charset="0"/>
+                <a:cs typeface="CMU Serif Roman" charset="0"/>
+              </a:rPr>
+              <a:t>Mirror</a:t>
+            </a:r>
+            <a:endParaRPr lang="en-GB" dirty="0">
+              <a:latin typeface="CMU Serif Roman" charset="0"/>
+              <a:ea typeface="CMU Serif Roman" charset="0"/>
+              <a:cs typeface="CMU Serif Roman" charset="0"/>
+            </a:endParaRPr>
+          </a:p>
+        </p:txBody>
+      </p:sp>
     </p:spTree>
     <p:extLst>
       <p:ext uri="{BB962C8B-B14F-4D97-AF65-F5344CB8AC3E}">

</xml_diff>

<commit_message>
worked upon methods - added more content to methods - added an extra graph to results - progress has been made
</commit_message>
<xml_diff>
--- a/lab_reports/optical_fourier_transforms/method/diagrams.pptx
+++ b/lab_reports/optical_fourier_transforms/method/diagrams.pptx
@@ -3564,7 +3564,7 @@
                 <a:ea typeface="CMU Serif Roman" charset="0"/>
                 <a:cs typeface="CMU Serif Roman" charset="0"/>
               </a:rPr>
-              <a:t>Lens</a:t>
+              <a:t>Lens 1</a:t>
             </a:r>
             <a:endParaRPr lang="en-GB" dirty="0">
               <a:latin typeface="CMU Serif Roman" charset="0"/>
@@ -4147,8 +4147,8 @@
         </p:nvSpPr>
         <p:spPr>
           <a:xfrm>
-            <a:off x="4518645" y="2043304"/>
-            <a:ext cx="649745" cy="369332"/>
+            <a:off x="4411774" y="2051470"/>
+            <a:ext cx="925483" cy="369332"/>
           </a:xfrm>
           <a:prstGeom prst="rect">
             <a:avLst/>
@@ -4163,12 +4163,12 @@
           <a:p>
             <a:pPr algn="ctr"/>
             <a:r>
-              <a:rPr lang="en-GB" dirty="0" smtClean="0">
+              <a:rPr lang="en-GB" smtClean="0">
                 <a:latin typeface="CMU Serif Roman" charset="0"/>
                 <a:ea typeface="CMU Serif Roman" charset="0"/>
                 <a:cs typeface="CMU Serif Roman" charset="0"/>
               </a:rPr>
-              <a:t>Lens</a:t>
+              <a:t>Lens 2</a:t>
             </a:r>
             <a:endParaRPr lang="en-GB" dirty="0">
               <a:latin typeface="CMU Serif Roman" charset="0"/>

</xml_diff>